<commit_message>
Move to 4.0 URLs
</commit_message>
<xml_diff>
--- a/lectures/DJ-12-Owned-Rows.pptx
+++ b/lectures/DJ-12-Owned-Rows.pptx
@@ -222,7 +222,7 @@
           <a:p>
             <a:fld id="{C97B56FC-7D2E-F343-9D09-0D14B00AA564}" type="datetimeFigureOut">
               <a:rPr lang="en-US" smtClean="0"/>
-              <a:t>3/11/22</a:t>
+              <a:t>9/16/22</a:t>
             </a:fld>
             <a:endParaRPr lang="en-US"/>
           </a:p>
@@ -839,7 +839,7 @@
           <a:p>
             <a:fld id="{EEE7C04C-7AF8-1445-A186-502B631B934F}" type="datetimeFigureOut">
               <a:rPr lang="en-US" smtClean="0"/>
-              <a:t>3/11/22</a:t>
+              <a:t>9/16/22</a:t>
             </a:fld>
             <a:endParaRPr lang="en-US"/>
           </a:p>
@@ -1004,7 +1004,7 @@
           <a:p>
             <a:fld id="{EEE7C04C-7AF8-1445-A186-502B631B934F}" type="datetimeFigureOut">
               <a:rPr lang="en-US" smtClean="0"/>
-              <a:t>3/11/22</a:t>
+              <a:t>9/16/22</a:t>
             </a:fld>
             <a:endParaRPr lang="en-US"/>
           </a:p>
@@ -1179,7 +1179,7 @@
           <a:p>
             <a:fld id="{EEE7C04C-7AF8-1445-A186-502B631B934F}" type="datetimeFigureOut">
               <a:rPr lang="en-US" smtClean="0"/>
-              <a:t>3/11/22</a:t>
+              <a:t>9/16/22</a:t>
             </a:fld>
             <a:endParaRPr lang="en-US"/>
           </a:p>
@@ -1487,7 +1487,7 @@
           <a:p>
             <a:fld id="{EEE7C04C-7AF8-1445-A186-502B631B934F}" type="datetimeFigureOut">
               <a:rPr lang="en-US" smtClean="0"/>
-              <a:t>3/11/22</a:t>
+              <a:t>9/16/22</a:t>
             </a:fld>
             <a:endParaRPr lang="en-US"/>
           </a:p>
@@ -1728,7 +1728,7 @@
           <a:p>
             <a:fld id="{EEE7C04C-7AF8-1445-A186-502B631B934F}" type="datetimeFigureOut">
               <a:rPr lang="en-US" smtClean="0"/>
-              <a:t>3/11/22</a:t>
+              <a:t>9/16/22</a:t>
             </a:fld>
             <a:endParaRPr lang="en-US"/>
           </a:p>
@@ -1955,7 +1955,7 @@
           <a:p>
             <a:fld id="{EEE7C04C-7AF8-1445-A186-502B631B934F}" type="datetimeFigureOut">
               <a:rPr lang="en-US" smtClean="0"/>
-              <a:t>3/11/22</a:t>
+              <a:t>9/16/22</a:t>
             </a:fld>
             <a:endParaRPr lang="en-US"/>
           </a:p>
@@ -2317,7 +2317,7 @@
           <a:p>
             <a:fld id="{EEE7C04C-7AF8-1445-A186-502B631B934F}" type="datetimeFigureOut">
               <a:rPr lang="en-US" smtClean="0"/>
-              <a:t>3/11/22</a:t>
+              <a:t>9/16/22</a:t>
             </a:fld>
             <a:endParaRPr lang="en-US"/>
           </a:p>
@@ -2430,7 +2430,7 @@
           <a:p>
             <a:fld id="{EEE7C04C-7AF8-1445-A186-502B631B934F}" type="datetimeFigureOut">
               <a:rPr lang="en-US" smtClean="0"/>
-              <a:t>3/11/22</a:t>
+              <a:t>9/16/22</a:t>
             </a:fld>
             <a:endParaRPr lang="en-US"/>
           </a:p>
@@ -2520,7 +2520,7 @@
           <a:p>
             <a:fld id="{EEE7C04C-7AF8-1445-A186-502B631B934F}" type="datetimeFigureOut">
               <a:rPr lang="en-US" smtClean="0"/>
-              <a:t>3/11/22</a:t>
+              <a:t>9/16/22</a:t>
             </a:fld>
             <a:endParaRPr lang="en-US"/>
           </a:p>
@@ -2792,7 +2792,7 @@
           <a:p>
             <a:fld id="{EEE7C04C-7AF8-1445-A186-502B631B934F}" type="datetimeFigureOut">
               <a:rPr lang="en-US" smtClean="0"/>
-              <a:t>3/11/22</a:t>
+              <a:t>9/16/22</a:t>
             </a:fld>
             <a:endParaRPr lang="en-US"/>
           </a:p>
@@ -3044,7 +3044,7 @@
           <a:p>
             <a:fld id="{EEE7C04C-7AF8-1445-A186-502B631B934F}" type="datetimeFigureOut">
               <a:rPr lang="en-US" smtClean="0"/>
-              <a:t>3/11/22</a:t>
+              <a:t>9/16/22</a:t>
             </a:fld>
             <a:endParaRPr lang="en-US"/>
           </a:p>
@@ -3251,7 +3251,7 @@
           <a:p>
             <a:fld id="{EEE7C04C-7AF8-1445-A186-502B631B934F}" type="datetimeFigureOut">
               <a:rPr lang="en-US" smtClean="0"/>
-              <a:t>3/11/22</a:t>
+              <a:t>9/16/22</a:t>
             </a:fld>
             <a:endParaRPr lang="en-US"/>
           </a:p>
@@ -4061,7 +4061,7 @@
             </a:r>
             <a:r>
               <a:rPr lang="en-US" dirty="0"/>
-              <a:t>/3.2/ref/class-based-views/generic-display/#</a:t>
+              <a:t>/4.0/ref/class-based-views/generic-display/#</a:t>
             </a:r>
             <a:r>
               <a:rPr lang="en-US" dirty="0" err="1"/>
@@ -13421,7 +13421,7 @@
             </a:r>
             <a:r>
               <a:rPr lang="en-US" dirty="0"/>
-              <a:t>/3.2/ref/class-based-views/</a:t>
+              <a:t>/4.0/ref/class-based-views/</a:t>
             </a:r>
             <a:r>
               <a:rPr lang="en-US" dirty="0" err="1"/>
@@ -26400,14 +26400,14 @@
           </a:ln>
           <a:extLst>
             <a:ext uri="{909E8E84-426E-40dd-AFC4-6F175D3DCCD1}">
-              <a14:hiddenFill xmlns="" xmlns:a14="http://schemas.microsoft.com/office/drawing/2010/main">
+              <a14:hiddenFill xmlns:a14="http://schemas.microsoft.com/office/drawing/2010/main" xmlns="">
                 <a:solidFill>
                   <a:srgbClr val="FFFFFF"/>
                 </a:solidFill>
               </a14:hiddenFill>
             </a:ext>
             <a:ext uri="{91240B29-F687-4f45-9708-019B960494DF}">
-              <a14:hiddenLine xmlns="" xmlns:a14="http://schemas.microsoft.com/office/drawing/2010/main" w="9525">
+              <a14:hiddenLine xmlns:a14="http://schemas.microsoft.com/office/drawing/2010/main" xmlns="" w="9525">
                 <a:solidFill>
                   <a:srgbClr val="000000"/>
                 </a:solidFill>

</xml_diff>